<commit_message>
Dodaje moje pliki (poprawki w interfejsie)
</commit_message>
<xml_diff>
--- a/docs/PP4.pptx
+++ b/docs/PP4.pptx
@@ -271,6 +271,11 @@
         </p:txBody>
       </p:sp>
     </p:spTree>
+    <p:extLst>
+      <p:ext uri="{BB962C8B-B14F-4D97-AF65-F5344CB8AC3E}">
+        <p14:creationId xmlns:p14="http://schemas.microsoft.com/office/powerpoint/2010/main" val="4276670500"/>
+      </p:ext>
+    </p:extLst>
   </p:cSld>
   <p:clrMap bg1="lt1" tx1="dk1" bg2="lt2" tx2="dk2" accent1="accent1" accent2="accent2" accent3="accent3" accent4="accent4" accent5="accent5" accent6="accent6" hlink="hlink" folHlink="folHlink"/>
 </p:handoutMaster>
@@ -513,6 +518,11 @@
         </p:txBody>
       </p:sp>
     </p:spTree>
+    <p:extLst>
+      <p:ext uri="{BB962C8B-B14F-4D97-AF65-F5344CB8AC3E}">
+        <p14:creationId xmlns:p14="http://schemas.microsoft.com/office/powerpoint/2010/main" val="1421322668"/>
+      </p:ext>
+    </p:extLst>
   </p:cSld>
   <p:clrMap bg1="lt1" tx1="dk1" bg2="lt2" tx2="dk2" accent1="accent1" accent2="accent2" accent3="accent3" accent4="accent4" accent5="accent5" accent6="accent6" hlink="hlink" folHlink="folHlink"/>
   <p:notesStyle>
@@ -2914,7 +2924,12 @@
             <p:ph type="ctrTitle"/>
           </p:nvPr>
         </p:nvSpPr>
-        <p:spPr/>
+        <p:spPr>
+          <a:xfrm>
+            <a:off x="1403648" y="4797152"/>
+            <a:ext cx="7507560" cy="1222375"/>
+          </a:xfrm>
+        </p:spPr>
         <p:txBody>
           <a:bodyPr/>
           <a:lstStyle/>
@@ -2937,7 +2952,12 @@
             <p:ph type="subTitle" idx="1"/>
           </p:nvPr>
         </p:nvSpPr>
-        <p:spPr/>
+        <p:spPr>
+          <a:xfrm>
+            <a:off x="1403648" y="3886200"/>
+            <a:ext cx="7435552" cy="914400"/>
+          </a:xfrm>
+        </p:spPr>
         <p:txBody>
           <a:bodyPr>
             <a:normAutofit/>
@@ -2952,6 +2972,36 @@
           </a:p>
         </p:txBody>
       </p:sp>
+      <p:pic>
+        <p:nvPicPr>
+          <p:cNvPr id="4" name="Obraz 3"/>
+          <p:cNvPicPr>
+            <a:picLocks noChangeAspect="1"/>
+          </p:cNvPicPr>
+          <p:nvPr/>
+        </p:nvPicPr>
+        <p:blipFill>
+          <a:blip r:embed="rId3">
+            <a:extLst>
+              <a:ext uri="{28A0092B-C50C-407E-A947-70E740481C1C}">
+                <a14:useLocalDpi xmlns:a14="http://schemas.microsoft.com/office/drawing/2010/main" val="0"/>
+              </a:ext>
+            </a:extLst>
+          </a:blip>
+          <a:stretch>
+            <a:fillRect/>
+          </a:stretch>
+        </p:blipFill>
+        <p:spPr>
+          <a:xfrm>
+            <a:off x="323528" y="4365104"/>
+            <a:ext cx="1147192" cy="1147192"/>
+          </a:xfrm>
+          <a:prstGeom prst="rect">
+            <a:avLst/>
+          </a:prstGeom>
+        </p:spPr>
+      </p:pic>
     </p:spTree>
   </p:cSld>
   <p:clrMapOvr>
@@ -3032,11 +3082,7 @@
             </a:pPr>
             <a:r>
               <a:rPr lang="pl-PL" dirty="0" smtClean="0"/>
-              <a:t>Został zaprojektowany w celu</a:t>
-            </a:r>
-            <a:r>
-              <a:rPr lang="pl-PL" dirty="0" smtClean="0"/>
-              <a:t>:</a:t>
+              <a:t>Został zaprojektowany w celu:</a:t>
             </a:r>
           </a:p>
           <a:p>
@@ -3068,7 +3114,6 @@
               <a:rPr lang="pl-PL" dirty="0" smtClean="0"/>
               <a:t>Kierownik posiada również funkcjonalność konta recepcjonistki</a:t>
             </a:r>
-            <a:endParaRPr lang="pl-PL" dirty="0" smtClean="0"/>
           </a:p>
         </p:txBody>
       </p:sp>
@@ -3935,7 +3980,6 @@
               <a:rPr lang="pl-PL" dirty="0" smtClean="0"/>
               <a:t>Generowania rachunków i faktur w formacie PDF</a:t>
             </a:r>
-            <a:endParaRPr lang="pl-PL" dirty="0" smtClean="0"/>
           </a:p>
           <a:p>
             <a:r>
@@ -3950,7 +3994,6 @@
               <a:rPr lang="pl-PL" dirty="0" smtClean="0"/>
               <a:t> do klientów</a:t>
             </a:r>
-            <a:endParaRPr lang="pl-PL" dirty="0" smtClean="0"/>
           </a:p>
           <a:p>
             <a:r>
@@ -4034,7 +4077,6 @@
               <a:rPr lang="pl-PL" dirty="0" smtClean="0"/>
               <a:t>Platforma</a:t>
             </a:r>
-            <a:endParaRPr lang="pl-PL" dirty="0" smtClean="0"/>
           </a:p>
           <a:p>
             <a:pPr lvl="1"/>
@@ -4042,14 +4084,12 @@
               <a:rPr lang="pl-PL" dirty="0" smtClean="0"/>
               <a:t>.NET</a:t>
             </a:r>
-            <a:endParaRPr lang="pl-PL" dirty="0" smtClean="0"/>
           </a:p>
           <a:p>
             <a:r>
               <a:rPr lang="pl-PL" dirty="0" smtClean="0"/>
               <a:t>Interfejs</a:t>
             </a:r>
-            <a:endParaRPr lang="pl-PL" dirty="0" smtClean="0"/>
           </a:p>
           <a:p>
             <a:pPr lvl="1"/>
@@ -4057,14 +4097,12 @@
               <a:rPr lang="pl-PL" dirty="0" smtClean="0"/>
               <a:t>WPF</a:t>
             </a:r>
-            <a:endParaRPr lang="pl-PL" dirty="0" smtClean="0"/>
           </a:p>
           <a:p>
             <a:r>
               <a:rPr lang="pl-PL" dirty="0" smtClean="0"/>
               <a:t>Baza danych</a:t>
             </a:r>
-            <a:endParaRPr lang="pl-PL" dirty="0" smtClean="0"/>
           </a:p>
           <a:p>
             <a:pPr lvl="1"/>
@@ -4072,7 +4110,6 @@
               <a:rPr lang="pl-PL" dirty="0" smtClean="0"/>
               <a:t>MS SQL Server 2008 R2</a:t>
             </a:r>
-            <a:endParaRPr lang="pl-PL" dirty="0" smtClean="0"/>
           </a:p>
         </p:txBody>
       </p:sp>
@@ -5461,7 +5498,7 @@
 </file>
 
 <file path=customXml/item1.xml><?xml version="1.0" encoding="utf-8"?>
-<ct:contentTypeSchema xmlns:ct="http://schemas.microsoft.com/office/2006/metadata/contentType" xmlns:ma="http://schemas.microsoft.com/office/2006/metadata/properties/metaAttributes" ct:_="" ma:_="" ma:contentTypeName="TemplateFile" ma:contentTypeID="0x010100CFA5F52AA0A00C4CBEF2A37681B2318F04009FDCD24A096B5E4C8184D4910FEB1A76" ma:contentTypeVersion="29" ma:contentTypeDescription="Create a new document." ma:contentTypeScope="" ma:versionID="0c32a1e609da7aca8c8cb70e77704eef"/>
+<p:properties xmlns:p="http://schemas.microsoft.com/office/2006/metadata/properties" xmlns:xsi="http://www.w3.org/2001/XMLSchema-instance" xmlns:pc="http://schemas.microsoft.com/office/infopath/2007/PartnerControls"/>
 </file>
 
 <file path=customXml/item2.xml><?xml version="1.0" encoding="utf-8"?>
@@ -5474,14 +5511,14 @@
 </file>
 
 <file path=customXml/item3.xml><?xml version="1.0" encoding="utf-8"?>
-<p:properties xmlns:p="http://schemas.microsoft.com/office/2006/metadata/properties" xmlns:xsi="http://www.w3.org/2001/XMLSchema-instance" xmlns:pc="http://schemas.microsoft.com/office/infopath/2007/PartnerControls"/>
+<ct:contentTypeSchema xmlns:ct="http://schemas.microsoft.com/office/2006/metadata/contentType" xmlns:ma="http://schemas.microsoft.com/office/2006/metadata/properties/metaAttributes" ct:_="" ma:_="" ma:contentTypeName="TemplateFile" ma:contentTypeID="0x010100CFA5F52AA0A00C4CBEF2A37681B2318F04009FDCD24A096B5E4C8184D4910FEB1A76" ma:contentTypeVersion="29" ma:contentTypeDescription="Create a new document." ma:contentTypeScope="" ma:versionID="0c32a1e609da7aca8c8cb70e77704eef"/>
 </file>
 
 <file path=customXml/itemProps1.xml><?xml version="1.0" encoding="utf-8"?>
-<ds:datastoreItem xmlns:ds="http://schemas.openxmlformats.org/officeDocument/2006/customXml" ds:itemID="{5128E5C6-253A-4341-BEE7-BE070F7B51FF}">
+<ds:datastoreItem xmlns:ds="http://schemas.openxmlformats.org/officeDocument/2006/customXml" ds:itemID="{1BC61C9C-1353-410C-9510-3EAD2B34FCBA}">
   <ds:schemaRefs>
-    <ds:schemaRef ds:uri="http://schemas.microsoft.com/office/2006/metadata/contentType"/>
-    <ds:schemaRef ds:uri="http://schemas.microsoft.com/office/2006/metadata/properties/metaAttributes"/>
+    <ds:schemaRef ds:uri="http://schemas.microsoft.com/office/2006/metadata/properties"/>
+    <ds:schemaRef ds:uri="http://schemas.microsoft.com/office/infopath/2007/PartnerControls"/>
   </ds:schemaRefs>
 </ds:datastoreItem>
 </file>
@@ -5495,10 +5532,10 @@
 </file>
 
 <file path=customXml/itemProps3.xml><?xml version="1.0" encoding="utf-8"?>
-<ds:datastoreItem xmlns:ds="http://schemas.openxmlformats.org/officeDocument/2006/customXml" ds:itemID="{1BC61C9C-1353-410C-9510-3EAD2B34FCBA}">
+<ds:datastoreItem xmlns:ds="http://schemas.openxmlformats.org/officeDocument/2006/customXml" ds:itemID="{5128E5C6-253A-4341-BEE7-BE070F7B51FF}">
   <ds:schemaRefs>
-    <ds:schemaRef ds:uri="http://schemas.microsoft.com/office/2006/metadata/properties"/>
-    <ds:schemaRef ds:uri="http://schemas.microsoft.com/office/infopath/2007/PartnerControls"/>
+    <ds:schemaRef ds:uri="http://schemas.microsoft.com/office/2006/metadata/contentType"/>
+    <ds:schemaRef ds:uri="http://schemas.microsoft.com/office/2006/metadata/properties/metaAttributes"/>
   </ds:schemaRefs>
 </ds:datastoreItem>
 </file>
</xml_diff>